<commit_message>
Room change (16/2). Some minor changes to lecture notes 04.
</commit_message>
<xml_diff>
--- a/lectures/04 - nonpreemptive.pptx
+++ b/lectures/04 - nonpreemptive.pptx
@@ -5538,7 +5538,7 @@
           <a:graphicData uri="http://schemas.openxmlformats.org/presentationml/2006/ole">
             <mc:AlternateContent xmlns:mc="http://schemas.openxmlformats.org/markup-compatibility/2006">
               <mc:Choice xmlns:v="urn:schemas-microsoft-com:vml" Requires="v">
-                <p:oleObj spid="_x0000_s1052" name="Image" r:id="rId14" imgW="4444444" imgH="4393651" progId="">
+                <p:oleObj spid="_x0000_s1054" name="Image" r:id="rId14" imgW="4444444" imgH="4393651" progId="">
                   <p:embed/>
                 </p:oleObj>
               </mc:Choice>
@@ -12776,7 +12776,7 @@
             </a:pPr>
             <a:r>
               <a:rPr lang="en-US" sz="2400" dirty="0"/>
-              <a:t>In a later course on parallel programming you will revisit this material</a:t>
+              <a:t>In later courses on parallel programming you will revisit this material</a:t>
             </a:r>
           </a:p>
           <a:p>

</xml_diff>